<commit_message>
Day 19: Data Imputation and Outliers
</commit_message>
<xml_diff>
--- a/slides/imputation&outliers.pptx
+++ b/slides/imputation&outliers.pptx
@@ -5,7 +5,7 @@
     <p:sldMasterId id="2147483648" r:id="rId1"/>
   </p:sldMasterIdLst>
   <p:notesMasterIdLst>
-    <p:notesMasterId r:id="rId21"/>
+    <p:notesMasterId r:id="rId22"/>
   </p:notesMasterIdLst>
   <p:sldIdLst>
     <p:sldId id="256" r:id="rId3"/>
@@ -17,33 +17,34 @@
     <p:sldId id="317" r:id="rId9"/>
     <p:sldId id="324" r:id="rId10"/>
     <p:sldId id="325" r:id="rId11"/>
-    <p:sldId id="326" r:id="rId12"/>
-    <p:sldId id="327" r:id="rId13"/>
-    <p:sldId id="328" r:id="rId14"/>
-    <p:sldId id="329" r:id="rId15"/>
-    <p:sldId id="330" r:id="rId16"/>
-    <p:sldId id="331" r:id="rId17"/>
-    <p:sldId id="332" r:id="rId18"/>
-    <p:sldId id="333" r:id="rId19"/>
-    <p:sldId id="298" r:id="rId20"/>
+    <p:sldId id="336" r:id="rId12"/>
+    <p:sldId id="326" r:id="rId13"/>
+    <p:sldId id="327" r:id="rId14"/>
+    <p:sldId id="328" r:id="rId15"/>
+    <p:sldId id="329" r:id="rId16"/>
+    <p:sldId id="330" r:id="rId17"/>
+    <p:sldId id="331" r:id="rId18"/>
+    <p:sldId id="332" r:id="rId19"/>
+    <p:sldId id="333" r:id="rId20"/>
+    <p:sldId id="298" r:id="rId21"/>
   </p:sldIdLst>
   <p:sldSz cx="18288000" cy="10287000"/>
   <p:notesSz cx="6858000" cy="9144000"/>
   <p:embeddedFontLst>
     <p:embeddedFont>
       <p:font typeface="Nourd-Bold" panose="01000000000000000000" charset="0"/>
-      <p:bold r:id="rId25"/>
+      <p:bold r:id="rId26"/>
     </p:embeddedFont>
     <p:embeddedFont>
       <p:font typeface="Nourd-SemiBold" panose="01000000000000000000" charset="0"/>
-      <p:bold r:id="rId26"/>
+      <p:bold r:id="rId27"/>
     </p:embeddedFont>
     <p:embeddedFont>
       <p:font typeface="Calibri" panose="020F0502020204030204" charset="0"/>
-      <p:regular r:id="rId27"/>
-      <p:bold r:id="rId28"/>
-      <p:italic r:id="rId29"/>
-      <p:boldItalic r:id="rId30"/>
+      <p:regular r:id="rId28"/>
+      <p:bold r:id="rId29"/>
+      <p:italic r:id="rId30"/>
+      <p:boldItalic r:id="rId31"/>
     </p:embeddedFont>
   </p:embeddedFontLst>
   <p:defaultTextStyle>
@@ -3705,13 +3706,180 @@
       </p:sp>
       <p:sp>
         <p:nvSpPr>
-          <p:cNvPr id="6" name="TextBox 2"/>
+          <p:cNvPr id="8" name="Text Box 7"/>
           <p:cNvSpPr txBox="1"/>
           <p:nvPr/>
         </p:nvSpPr>
         <p:spPr>
           <a:xfrm>
-            <a:off x="27940" y="1085850"/>
+            <a:off x="8826500" y="3463925"/>
+            <a:ext cx="9272905" cy="6639560"/>
+          </a:xfrm>
+          <a:prstGeom prst="rect">
+            <a:avLst/>
+          </a:prstGeom>
+          <a:noFill/>
+        </p:spPr>
+        <p:txBody>
+          <a:bodyPr wrap="square" rtlCol="0" anchor="t">
+            <a:noAutofit/>
+          </a:bodyPr>
+          <a:lstStyle/>
+          <a:p>
+            <a:pPr indent="0">
+              <a:lnSpc>
+                <a:spcPct val="115000"/>
+              </a:lnSpc>
+              <a:spcBef>
+                <a:spcPts val="0"/>
+              </a:spcBef>
+              <a:spcAft>
+                <a:spcPts val="0"/>
+              </a:spcAft>
+              <a:buFont typeface="Arial" panose="020B0604020202020204" pitchFamily="34" charset="0"/>
+              <a:buNone/>
+            </a:pPr>
+            <a:r>
+              <a:rPr lang="en-US" altLang="en-US" sz="3600" dirty="0">
+                <a:solidFill>
+                  <a:srgbClr val="1C1C1C"/>
+                </a:solidFill>
+                <a:latin typeface="Nourd-SemiBold" panose="01000000000000000000" charset="0"/>
+                <a:ea typeface="Nourd Bold" panose="00000800000000000000"/>
+                <a:cs typeface="Nourd-SemiBold" panose="01000000000000000000" charset="0"/>
+                <a:sym typeface="Nourd Bold" panose="00000800000000000000"/>
+              </a:rPr>
+              <a:t>Box plot: </a:t>
+            </a:r>
+            <a:endParaRPr lang="en-US" altLang="en-US" sz="3600" dirty="0">
+              <a:solidFill>
+                <a:srgbClr val="1C1C1C"/>
+              </a:solidFill>
+              <a:latin typeface="Nourd-SemiBold" panose="01000000000000000000" charset="0"/>
+              <a:ea typeface="Nourd Bold" panose="00000800000000000000"/>
+              <a:cs typeface="Nourd-SemiBold" panose="01000000000000000000" charset="0"/>
+              <a:sym typeface="Nourd Bold" panose="00000800000000000000"/>
+            </a:endParaRPr>
+          </a:p>
+          <a:p>
+            <a:pPr marL="571500" indent="-571500">
+              <a:lnSpc>
+                <a:spcPct val="115000"/>
+              </a:lnSpc>
+              <a:spcBef>
+                <a:spcPts val="0"/>
+              </a:spcBef>
+              <a:spcAft>
+                <a:spcPts val="0"/>
+              </a:spcAft>
+              <a:buFont typeface="Arial" panose="020B0604020202020204" pitchFamily="34" charset="0"/>
+              <a:buChar char="•"/>
+            </a:pPr>
+            <a:r>
+              <a:rPr lang="en-US" altLang="en-US" sz="3600" dirty="0">
+                <a:solidFill>
+                  <a:srgbClr val="1C1C1C"/>
+                </a:solidFill>
+                <a:latin typeface="Nourd-SemiBold" panose="01000000000000000000" charset="0"/>
+                <a:ea typeface="Nourd Bold" panose="00000800000000000000"/>
+                <a:cs typeface="Nourd-SemiBold" panose="01000000000000000000" charset="0"/>
+                <a:sym typeface="Nourd Bold" panose="00000800000000000000"/>
+              </a:rPr>
+              <a:t>graphical distribution of data distribution</a:t>
+            </a:r>
+            <a:endParaRPr lang="en-US" altLang="en-US" sz="3600" dirty="0">
+              <a:solidFill>
+                <a:srgbClr val="1C1C1C"/>
+              </a:solidFill>
+              <a:latin typeface="Nourd-SemiBold" panose="01000000000000000000" charset="0"/>
+              <a:ea typeface="Nourd Bold" panose="00000800000000000000"/>
+              <a:cs typeface="Nourd-SemiBold" panose="01000000000000000000" charset="0"/>
+              <a:sym typeface="Nourd Bold" panose="00000800000000000000"/>
+            </a:endParaRPr>
+          </a:p>
+          <a:p>
+            <a:pPr marL="571500" indent="-571500">
+              <a:lnSpc>
+                <a:spcPct val="115000"/>
+              </a:lnSpc>
+              <a:spcBef>
+                <a:spcPts val="0"/>
+              </a:spcBef>
+              <a:spcAft>
+                <a:spcPts val="0"/>
+              </a:spcAft>
+              <a:buFont typeface="Arial" panose="020B0604020202020204" pitchFamily="34" charset="0"/>
+              <a:buChar char="•"/>
+            </a:pPr>
+            <a:r>
+              <a:rPr lang="en-US" altLang="en-US" sz="3600" dirty="0">
+                <a:solidFill>
+                  <a:srgbClr val="1C1C1C"/>
+                </a:solidFill>
+                <a:latin typeface="Nourd-SemiBold" panose="01000000000000000000" charset="0"/>
+                <a:ea typeface="Nourd Bold" panose="00000800000000000000"/>
+                <a:cs typeface="Nourd-SemiBold" panose="01000000000000000000" charset="0"/>
+                <a:sym typeface="Nourd Bold" panose="00000800000000000000"/>
+              </a:rPr>
+              <a:t>marks the minimum, maximum, median, first, and third quartiles of the dataset</a:t>
+            </a:r>
+            <a:endParaRPr lang="en-US" altLang="en-US" sz="3600" dirty="0">
+              <a:solidFill>
+                <a:srgbClr val="1C1C1C"/>
+              </a:solidFill>
+              <a:latin typeface="Nourd-SemiBold" panose="01000000000000000000" charset="0"/>
+              <a:ea typeface="Nourd Bold" panose="00000800000000000000"/>
+              <a:cs typeface="Nourd-SemiBold" panose="01000000000000000000" charset="0"/>
+              <a:sym typeface="Nourd Bold" panose="00000800000000000000"/>
+            </a:endParaRPr>
+          </a:p>
+          <a:p>
+            <a:pPr marL="571500" indent="-571500">
+              <a:lnSpc>
+                <a:spcPct val="115000"/>
+              </a:lnSpc>
+              <a:spcBef>
+                <a:spcPts val="0"/>
+              </a:spcBef>
+              <a:spcAft>
+                <a:spcPts val="0"/>
+              </a:spcAft>
+              <a:buFont typeface="Arial" panose="020B0604020202020204" pitchFamily="34" charset="0"/>
+              <a:buChar char="•"/>
+            </a:pPr>
+            <a:r>
+              <a:rPr lang="en-US" altLang="en-US" sz="3600" dirty="0">
+                <a:solidFill>
+                  <a:srgbClr val="1C1C1C"/>
+                </a:solidFill>
+                <a:latin typeface="Nourd-SemiBold" panose="01000000000000000000" charset="0"/>
+                <a:ea typeface="Nourd Bold" panose="00000800000000000000"/>
+                <a:cs typeface="Nourd-SemiBold" panose="01000000000000000000" charset="0"/>
+                <a:sym typeface="Nourd Bold" panose="00000800000000000000"/>
+              </a:rPr>
+              <a:t>Any data points that show above or below the whiskers, can be considered outliers</a:t>
+            </a:r>
+            <a:endParaRPr lang="en-US" altLang="en-US" sz="3600" dirty="0">
+              <a:solidFill>
+                <a:srgbClr val="1C1C1C"/>
+              </a:solidFill>
+              <a:latin typeface="Nourd-SemiBold" panose="01000000000000000000" charset="0"/>
+              <a:ea typeface="Nourd Bold" panose="00000800000000000000"/>
+              <a:cs typeface="Nourd-SemiBold" panose="01000000000000000000" charset="0"/>
+              <a:sym typeface="Nourd Bold" panose="00000800000000000000"/>
+            </a:endParaRPr>
+          </a:p>
+        </p:txBody>
+      </p:sp>
+      <p:sp>
+        <p:nvSpPr>
+          <p:cNvPr id="7" name="TextBox 2"/>
+          <p:cNvSpPr txBox="1"/>
+          <p:nvPr/>
+        </p:nvSpPr>
+        <p:spPr>
+          <a:xfrm>
+            <a:off x="27940" y="1390650"/>
             <a:ext cx="18367375" cy="830580"/>
           </a:xfrm>
           <a:prstGeom prst="rect">
@@ -3722,7 +3890,6 @@
           <a:bodyPr wrap="square" lIns="0" tIns="0" rIns="0" bIns="0" rtlCol="0" anchor="b" anchorCtr="0">
             <a:spAutoFit/>
           </a:bodyPr>
-          <a:lstStyle/>
           <a:p>
             <a:pPr algn="ctr">
               <a:lnSpc>
@@ -3730,16 +3897,16 @@
               </a:lnSpc>
             </a:pPr>
             <a:r>
-              <a:rPr lang="en-US" altLang="en-US" sz="5400" dirty="0">
+              <a:rPr lang="en-US" sz="5400">
                 <a:solidFill>
                   <a:srgbClr val="1C1C1C"/>
                 </a:solidFill>
-                <a:latin typeface="Nourd-SemiBold" panose="01000000000000000000" charset="0"/>
-                <a:ea typeface="Nourd Bold" panose="00000800000000000000"/>
-                <a:cs typeface="Nourd-SemiBold" panose="01000000000000000000" charset="0"/>
-                <a:sym typeface="Nourd Bold" panose="00000800000000000000"/>
+                <a:latin typeface="Nourd-Bold" panose="01000000000000000000" charset="0"/>
+                <a:ea typeface="Hatton Ultra-Bold" panose="00000900000000000000"/>
+                <a:cs typeface="Nourd-Bold" panose="01000000000000000000" charset="0"/>
+                <a:sym typeface="Hatton Ultra-Bold" panose="00000900000000000000"/>
               </a:rPr>
-              <a:t>Standard Deviation Method</a:t>
+              <a:t>Boxplots</a:t>
             </a:r>
             <a:endParaRPr lang="en-US" sz="5400">
               <a:solidFill>
@@ -3753,16 +3920,40 @@
           </a:p>
         </p:txBody>
       </p:sp>
-      <p:sp>
-        <p:nvSpPr>
-          <p:cNvPr id="5" name="Text Box 4"/>
+      <p:pic>
+        <p:nvPicPr>
+          <p:cNvPr id="4" name="Picture 3"/>
+          <p:cNvPicPr>
+            <a:picLocks noChangeAspect="1"/>
+          </p:cNvPicPr>
+          <p:nvPr/>
+        </p:nvPicPr>
+        <p:blipFill>
+          <a:blip r:embed="rId1"/>
+          <a:stretch>
+            <a:fillRect/>
+          </a:stretch>
+        </p:blipFill>
+        <p:spPr>
+          <a:xfrm>
+            <a:off x="-76200" y="3356610"/>
+            <a:ext cx="8253095" cy="6530975"/>
+          </a:xfrm>
+          <a:prstGeom prst="rect">
+            <a:avLst/>
+          </a:prstGeom>
+        </p:spPr>
+      </p:pic>
+      <p:sp>
+        <p:nvSpPr>
+          <p:cNvPr id="6" name="Text Box 5"/>
           <p:cNvSpPr txBox="1"/>
           <p:nvPr/>
         </p:nvSpPr>
         <p:spPr>
           <a:xfrm>
-            <a:off x="609600" y="2019300"/>
-            <a:ext cx="16817340" cy="1789430"/>
+            <a:off x="838200" y="2247900"/>
+            <a:ext cx="16757015" cy="996950"/>
           </a:xfrm>
           <a:prstGeom prst="rect">
             <a:avLst/>
@@ -3771,7 +3962,7 @@
         </p:spPr>
         <p:txBody>
           <a:bodyPr wrap="square" rtlCol="0" anchor="t">
-            <a:spAutoFit/>
+            <a:noAutofit/>
           </a:bodyPr>
           <a:p>
             <a:pPr indent="0">
@@ -3788,7 +3979,7 @@
               <a:buNone/>
             </a:pPr>
             <a:r>
-              <a:rPr lang="en-US" altLang="en-US" sz="3200" dirty="0">
+              <a:rPr lang="en-US" altLang="en-US" sz="3600" dirty="0">
                 <a:solidFill>
                   <a:srgbClr val="1C1C1C"/>
                 </a:solidFill>
@@ -3797,9 +3988,9 @@
                 <a:cs typeface="Nourd-SemiBold" panose="01000000000000000000" charset="0"/>
                 <a:sym typeface="Nourd Bold" panose="00000800000000000000"/>
               </a:rPr>
-              <a:t>(assuming data follows normal distribution)</a:t>
-            </a:r>
-            <a:endParaRPr lang="en-US" altLang="en-US" sz="3200" dirty="0">
+              <a:t>One of the simplest methods for detecting outliers is using box plot</a:t>
+            </a:r>
+            <a:endParaRPr lang="en-US" altLang="en-US" sz="3600" dirty="0">
               <a:solidFill>
                 <a:srgbClr val="1C1C1C"/>
               </a:solidFill>
@@ -3810,7 +4001,7 @@
             </a:endParaRPr>
           </a:p>
           <a:p>
-            <a:pPr marL="571500" indent="-571500">
+            <a:pPr indent="0">
               <a:lnSpc>
                 <a:spcPct val="115000"/>
               </a:lnSpc>
@@ -3821,21 +4012,9 @@
                 <a:spcPts val="0"/>
               </a:spcAft>
               <a:buFont typeface="Arial" panose="020B0604020202020204" pitchFamily="34" charset="0"/>
-              <a:buChar char="•"/>
+              <a:buNone/>
             </a:pPr>
-            <a:r>
-              <a:rPr lang="en-US" altLang="en-US" sz="3200" dirty="0">
-                <a:solidFill>
-                  <a:srgbClr val="1C1C1C"/>
-                </a:solidFill>
-                <a:latin typeface="Nourd-SemiBold" panose="01000000000000000000" charset="0"/>
-                <a:ea typeface="Nourd Bold" panose="00000800000000000000"/>
-                <a:cs typeface="Nourd-SemiBold" panose="01000000000000000000" charset="0"/>
-                <a:sym typeface="Nourd Bold" panose="00000800000000000000"/>
-              </a:rPr>
-              <a:t>data points outside of three standard deviations from the mean are considered outliers</a:t>
-            </a:r>
-            <a:endParaRPr lang="en-US" altLang="en-US" sz="3200" dirty="0">
+            <a:endParaRPr lang="en-US" altLang="en-US" sz="3600" dirty="0">
               <a:solidFill>
                 <a:srgbClr val="1C1C1C"/>
               </a:solidFill>
@@ -3847,54 +4026,6 @@
           </a:p>
         </p:txBody>
       </p:sp>
-      <p:pic>
-        <p:nvPicPr>
-          <p:cNvPr id="3" name="Picture 2"/>
-          <p:cNvPicPr>
-            <a:picLocks noChangeAspect="1"/>
-          </p:cNvPicPr>
-          <p:nvPr/>
-        </p:nvPicPr>
-        <p:blipFill>
-          <a:blip r:embed="rId1"/>
-          <a:stretch>
-            <a:fillRect/>
-          </a:stretch>
-        </p:blipFill>
-        <p:spPr>
-          <a:xfrm>
-            <a:off x="1371600" y="4000500"/>
-            <a:ext cx="10941685" cy="2381250"/>
-          </a:xfrm>
-          <a:prstGeom prst="rect">
-            <a:avLst/>
-          </a:prstGeom>
-        </p:spPr>
-      </p:pic>
-      <p:pic>
-        <p:nvPicPr>
-          <p:cNvPr id="4" name="Picture 3"/>
-          <p:cNvPicPr>
-            <a:picLocks noChangeAspect="1"/>
-          </p:cNvPicPr>
-          <p:nvPr/>
-        </p:nvPicPr>
-        <p:blipFill>
-          <a:blip r:embed="rId2"/>
-          <a:stretch>
-            <a:fillRect/>
-          </a:stretch>
-        </p:blipFill>
-        <p:spPr>
-          <a:xfrm>
-            <a:off x="1371600" y="6785610"/>
-            <a:ext cx="14280515" cy="3086100"/>
-          </a:xfrm>
-          <a:prstGeom prst="rect">
-            <a:avLst/>
-          </a:prstGeom>
-        </p:spPr>
-      </p:pic>
     </p:spTree>
   </p:cSld>
   <p:clrMapOvr>
@@ -4070,7 +4201,7 @@
                 <a:cs typeface="Nourd-SemiBold" panose="01000000000000000000" charset="0"/>
                 <a:sym typeface="Nourd Bold" panose="00000800000000000000"/>
               </a:rPr>
-              <a:t>IQR (InterQuartile Range) Method</a:t>
+              <a:t>Standard Deviation Method</a:t>
             </a:r>
             <a:endParaRPr lang="en-US" sz="5400">
               <a:solidFill>
@@ -4093,7 +4224,7 @@
         <p:spPr>
           <a:xfrm>
             <a:off x="609600" y="2019300"/>
-            <a:ext cx="16817340" cy="2355850"/>
+            <a:ext cx="16817340" cy="1789430"/>
           </a:xfrm>
           <a:prstGeom prst="rect">
             <a:avLst/>
@@ -4105,7 +4236,7 @@
             <a:spAutoFit/>
           </a:bodyPr>
           <a:p>
-            <a:pPr marL="571500" indent="-571500">
+            <a:pPr indent="0">
               <a:lnSpc>
                 <a:spcPct val="115000"/>
               </a:lnSpc>
@@ -4116,7 +4247,7 @@
                 <a:spcPts val="0"/>
               </a:spcAft>
               <a:buFont typeface="Arial" panose="020B0604020202020204" pitchFamily="34" charset="0"/>
-              <a:buChar char="•"/>
+              <a:buNone/>
             </a:pPr>
             <a:r>
               <a:rPr lang="en-US" altLang="en-US" sz="3200" dirty="0">
@@ -4128,7 +4259,7 @@
                 <a:cs typeface="Nourd-SemiBold" panose="01000000000000000000" charset="0"/>
                 <a:sym typeface="Nourd Bold" panose="00000800000000000000"/>
               </a:rPr>
-              <a:t>focuses on the spread of the middle 50% of data</a:t>
+              <a:t>(assuming data follows normal distribution)</a:t>
             </a:r>
             <a:endParaRPr lang="en-US" altLang="en-US" sz="3200" dirty="0">
               <a:solidFill>
@@ -4164,7 +4295,7 @@
                 <a:cs typeface="Nourd-SemiBold" panose="01000000000000000000" charset="0"/>
                 <a:sym typeface="Nourd Bold" panose="00000800000000000000"/>
               </a:rPr>
-              <a:t>IQR = difference between the 75th and 25th percentiles of the data</a:t>
+              <a:t>data points outside of three standard deviations from the mean are considered outliers</a:t>
             </a:r>
             <a:endParaRPr lang="en-US" altLang="en-US" sz="3200" dirty="0">
               <a:solidFill>
@@ -4176,47 +4307,11 @@
               <a:sym typeface="Nourd Bold" panose="00000800000000000000"/>
             </a:endParaRPr>
           </a:p>
-          <a:p>
-            <a:pPr marL="571500" indent="-571500">
-              <a:lnSpc>
-                <a:spcPct val="115000"/>
-              </a:lnSpc>
-              <a:spcBef>
-                <a:spcPts val="0"/>
-              </a:spcBef>
-              <a:spcAft>
-                <a:spcPts val="0"/>
-              </a:spcAft>
-              <a:buFont typeface="Arial" panose="020B0604020202020204" pitchFamily="34" charset="0"/>
-              <a:buChar char="•"/>
-            </a:pPr>
-            <a:r>
-              <a:rPr lang="en-US" altLang="en-US" sz="3200" dirty="0">
-                <a:solidFill>
-                  <a:srgbClr val="1C1C1C"/>
-                </a:solidFill>
-                <a:latin typeface="Nourd-SemiBold" panose="01000000000000000000" charset="0"/>
-                <a:ea typeface="Nourd Bold" panose="00000800000000000000"/>
-                <a:cs typeface="Nourd-SemiBold" panose="01000000000000000000" charset="0"/>
-                <a:sym typeface="Nourd Bold" panose="00000800000000000000"/>
-              </a:rPr>
-              <a:t>outliers = points that fall below 1.5 times the IQR below the 25th percentile, or above 1.5 times the IQR above the 75th percentile</a:t>
-            </a:r>
-            <a:endParaRPr lang="en-US" altLang="en-US" sz="3200" dirty="0">
-              <a:solidFill>
-                <a:srgbClr val="1C1C1C"/>
-              </a:solidFill>
-              <a:latin typeface="Nourd-SemiBold" panose="01000000000000000000" charset="0"/>
-              <a:ea typeface="Nourd Bold" panose="00000800000000000000"/>
-              <a:cs typeface="Nourd-SemiBold" panose="01000000000000000000" charset="0"/>
-              <a:sym typeface="Nourd Bold" panose="00000800000000000000"/>
-            </a:endParaRPr>
-          </a:p>
         </p:txBody>
       </p:sp>
       <p:pic>
         <p:nvPicPr>
-          <p:cNvPr id="2" name="Picture 1"/>
+          <p:cNvPr id="3" name="Picture 2"/>
           <p:cNvPicPr>
             <a:picLocks noChangeAspect="1"/>
           </p:cNvPicPr>
@@ -4230,8 +4325,32 @@
         </p:blipFill>
         <p:spPr>
           <a:xfrm>
-            <a:off x="3886200" y="4478020"/>
-            <a:ext cx="10194290" cy="5242560"/>
+            <a:off x="1371600" y="4000500"/>
+            <a:ext cx="10941685" cy="2381250"/>
+          </a:xfrm>
+          <a:prstGeom prst="rect">
+            <a:avLst/>
+          </a:prstGeom>
+        </p:spPr>
+      </p:pic>
+      <p:pic>
+        <p:nvPicPr>
+          <p:cNvPr id="4" name="Picture 3"/>
+          <p:cNvPicPr>
+            <a:picLocks noChangeAspect="1"/>
+          </p:cNvPicPr>
+          <p:nvPr/>
+        </p:nvPicPr>
+        <p:blipFill>
+          <a:blip r:embed="rId2"/>
+          <a:stretch>
+            <a:fillRect/>
+          </a:stretch>
+        </p:blipFill>
+        <p:spPr>
+          <a:xfrm>
+            <a:off x="1371600" y="6785610"/>
+            <a:ext cx="14280515" cy="3086100"/>
           </a:xfrm>
           <a:prstGeom prst="rect">
             <a:avLst/>
@@ -4427,9 +4546,139 @@
           </a:p>
         </p:txBody>
       </p:sp>
+      <p:sp>
+        <p:nvSpPr>
+          <p:cNvPr id="5" name="Text Box 4"/>
+          <p:cNvSpPr txBox="1"/>
+          <p:nvPr/>
+        </p:nvSpPr>
+        <p:spPr>
+          <a:xfrm>
+            <a:off x="609600" y="2019300"/>
+            <a:ext cx="16817340" cy="2355850"/>
+          </a:xfrm>
+          <a:prstGeom prst="rect">
+            <a:avLst/>
+          </a:prstGeom>
+          <a:noFill/>
+        </p:spPr>
+        <p:txBody>
+          <a:bodyPr wrap="square" rtlCol="0" anchor="t">
+            <a:spAutoFit/>
+          </a:bodyPr>
+          <a:p>
+            <a:pPr marL="571500" indent="-571500">
+              <a:lnSpc>
+                <a:spcPct val="115000"/>
+              </a:lnSpc>
+              <a:spcBef>
+                <a:spcPts val="0"/>
+              </a:spcBef>
+              <a:spcAft>
+                <a:spcPts val="0"/>
+              </a:spcAft>
+              <a:buFont typeface="Arial" panose="020B0604020202020204" pitchFamily="34" charset="0"/>
+              <a:buChar char="•"/>
+            </a:pPr>
+            <a:r>
+              <a:rPr lang="en-US" altLang="en-US" sz="3200" dirty="0">
+                <a:solidFill>
+                  <a:srgbClr val="1C1C1C"/>
+                </a:solidFill>
+                <a:latin typeface="Nourd-SemiBold" panose="01000000000000000000" charset="0"/>
+                <a:ea typeface="Nourd Bold" panose="00000800000000000000"/>
+                <a:cs typeface="Nourd-SemiBold" panose="01000000000000000000" charset="0"/>
+                <a:sym typeface="Nourd Bold" panose="00000800000000000000"/>
+              </a:rPr>
+              <a:t>focuses on the spread of the middle 50% of data</a:t>
+            </a:r>
+            <a:endParaRPr lang="en-US" altLang="en-US" sz="3200" dirty="0">
+              <a:solidFill>
+                <a:srgbClr val="1C1C1C"/>
+              </a:solidFill>
+              <a:latin typeface="Nourd-SemiBold" panose="01000000000000000000" charset="0"/>
+              <a:ea typeface="Nourd Bold" panose="00000800000000000000"/>
+              <a:cs typeface="Nourd-SemiBold" panose="01000000000000000000" charset="0"/>
+              <a:sym typeface="Nourd Bold" panose="00000800000000000000"/>
+            </a:endParaRPr>
+          </a:p>
+          <a:p>
+            <a:pPr marL="571500" indent="-571500">
+              <a:lnSpc>
+                <a:spcPct val="115000"/>
+              </a:lnSpc>
+              <a:spcBef>
+                <a:spcPts val="0"/>
+              </a:spcBef>
+              <a:spcAft>
+                <a:spcPts val="0"/>
+              </a:spcAft>
+              <a:buFont typeface="Arial" panose="020B0604020202020204" pitchFamily="34" charset="0"/>
+              <a:buChar char="•"/>
+            </a:pPr>
+            <a:r>
+              <a:rPr lang="en-US" altLang="en-US" sz="3200" dirty="0">
+                <a:solidFill>
+                  <a:srgbClr val="1C1C1C"/>
+                </a:solidFill>
+                <a:latin typeface="Nourd-SemiBold" panose="01000000000000000000" charset="0"/>
+                <a:ea typeface="Nourd Bold" panose="00000800000000000000"/>
+                <a:cs typeface="Nourd-SemiBold" panose="01000000000000000000" charset="0"/>
+                <a:sym typeface="Nourd Bold" panose="00000800000000000000"/>
+              </a:rPr>
+              <a:t>IQR = difference between the 75th and 25th percentiles of the data</a:t>
+            </a:r>
+            <a:endParaRPr lang="en-US" altLang="en-US" sz="3200" dirty="0">
+              <a:solidFill>
+                <a:srgbClr val="1C1C1C"/>
+              </a:solidFill>
+              <a:latin typeface="Nourd-SemiBold" panose="01000000000000000000" charset="0"/>
+              <a:ea typeface="Nourd Bold" panose="00000800000000000000"/>
+              <a:cs typeface="Nourd-SemiBold" panose="01000000000000000000" charset="0"/>
+              <a:sym typeface="Nourd Bold" panose="00000800000000000000"/>
+            </a:endParaRPr>
+          </a:p>
+          <a:p>
+            <a:pPr marL="571500" indent="-571500">
+              <a:lnSpc>
+                <a:spcPct val="115000"/>
+              </a:lnSpc>
+              <a:spcBef>
+                <a:spcPts val="0"/>
+              </a:spcBef>
+              <a:spcAft>
+                <a:spcPts val="0"/>
+              </a:spcAft>
+              <a:buFont typeface="Arial" panose="020B0604020202020204" pitchFamily="34" charset="0"/>
+              <a:buChar char="•"/>
+            </a:pPr>
+            <a:r>
+              <a:rPr lang="en-US" altLang="en-US" sz="3200" dirty="0">
+                <a:solidFill>
+                  <a:srgbClr val="1C1C1C"/>
+                </a:solidFill>
+                <a:latin typeface="Nourd-SemiBold" panose="01000000000000000000" charset="0"/>
+                <a:ea typeface="Nourd Bold" panose="00000800000000000000"/>
+                <a:cs typeface="Nourd-SemiBold" panose="01000000000000000000" charset="0"/>
+                <a:sym typeface="Nourd Bold" panose="00000800000000000000"/>
+              </a:rPr>
+              <a:t>outliers = points that fall below 1.5 times the IQR below the 25th percentile, or above 1.5 times the IQR above the 75th percentile</a:t>
+            </a:r>
+            <a:endParaRPr lang="en-US" altLang="en-US" sz="3200" dirty="0">
+              <a:solidFill>
+                <a:srgbClr val="1C1C1C"/>
+              </a:solidFill>
+              <a:latin typeface="Nourd-SemiBold" panose="01000000000000000000" charset="0"/>
+              <a:ea typeface="Nourd Bold" panose="00000800000000000000"/>
+              <a:cs typeface="Nourd-SemiBold" panose="01000000000000000000" charset="0"/>
+              <a:sym typeface="Nourd Bold" panose="00000800000000000000"/>
+            </a:endParaRPr>
+          </a:p>
+        </p:txBody>
+      </p:sp>
       <p:pic>
         <p:nvPicPr>
-          <p:cNvPr id="3" name="Picture 2"/>
+          <p:cNvPr id="2" name="Picture 1"/>
           <p:cNvPicPr>
             <a:picLocks noChangeAspect="1"/>
           </p:cNvPicPr>
@@ -4443,8 +4692,8 @@
         </p:blipFill>
         <p:spPr>
           <a:xfrm>
-            <a:off x="838200" y="2476500"/>
-            <a:ext cx="16586200" cy="7002145"/>
+            <a:off x="3886200" y="4478020"/>
+            <a:ext cx="10194290" cy="5242560"/>
           </a:xfrm>
           <a:prstGeom prst="rect">
             <a:avLst/>
@@ -4626,7 +4875,7 @@
                 <a:cs typeface="Nourd-SemiBold" panose="01000000000000000000" charset="0"/>
                 <a:sym typeface="Nourd Bold" panose="00000800000000000000"/>
               </a:rPr>
-              <a:t>Clustering Method</a:t>
+              <a:t>IQR (InterQuartile Range) Method</a:t>
             </a:r>
             <a:endParaRPr lang="en-US" sz="5400">
               <a:solidFill>
@@ -4640,100 +4889,6 @@
           </a:p>
         </p:txBody>
       </p:sp>
-      <p:sp>
-        <p:nvSpPr>
-          <p:cNvPr id="5" name="Text Box 4"/>
-          <p:cNvSpPr txBox="1"/>
-          <p:nvPr/>
-        </p:nvSpPr>
-        <p:spPr>
-          <a:xfrm>
-            <a:off x="609600" y="2019300"/>
-            <a:ext cx="16817340" cy="1789430"/>
-          </a:xfrm>
-          <a:prstGeom prst="rect">
-            <a:avLst/>
-          </a:prstGeom>
-          <a:noFill/>
-        </p:spPr>
-        <p:txBody>
-          <a:bodyPr wrap="square" rtlCol="0" anchor="t">
-            <a:spAutoFit/>
-          </a:bodyPr>
-          <a:p>
-            <a:pPr marL="571500" indent="-571500">
-              <a:lnSpc>
-                <a:spcPct val="115000"/>
-              </a:lnSpc>
-              <a:spcBef>
-                <a:spcPts val="0"/>
-              </a:spcBef>
-              <a:spcAft>
-                <a:spcPts val="0"/>
-              </a:spcAft>
-              <a:buFont typeface="Arial" panose="020B0604020202020204" pitchFamily="34" charset="0"/>
-              <a:buChar char="•"/>
-            </a:pPr>
-            <a:r>
-              <a:rPr lang="en-US" altLang="en-US" sz="3200" dirty="0">
-                <a:solidFill>
-                  <a:srgbClr val="1C1C1C"/>
-                </a:solidFill>
-                <a:latin typeface="Nourd-SemiBold" panose="01000000000000000000" charset="0"/>
-                <a:ea typeface="Nourd Bold" panose="00000800000000000000"/>
-                <a:cs typeface="Nourd-SemiBold" panose="01000000000000000000" charset="0"/>
-                <a:sym typeface="Nourd Bold" panose="00000800000000000000"/>
-              </a:rPr>
-              <a:t>Clustering is the process of grouping data points together based on their similarity to each other</a:t>
-            </a:r>
-            <a:endParaRPr lang="en-US" altLang="en-US" sz="3200" dirty="0">
-              <a:solidFill>
-                <a:srgbClr val="1C1C1C"/>
-              </a:solidFill>
-              <a:latin typeface="Nourd-SemiBold" panose="01000000000000000000" charset="0"/>
-              <a:ea typeface="Nourd Bold" panose="00000800000000000000"/>
-              <a:cs typeface="Nourd-SemiBold" panose="01000000000000000000" charset="0"/>
-              <a:sym typeface="Nourd Bold" panose="00000800000000000000"/>
-            </a:endParaRPr>
-          </a:p>
-          <a:p>
-            <a:pPr marL="571500" indent="-571500">
-              <a:lnSpc>
-                <a:spcPct val="115000"/>
-              </a:lnSpc>
-              <a:spcBef>
-                <a:spcPts val="0"/>
-              </a:spcBef>
-              <a:spcAft>
-                <a:spcPts val="0"/>
-              </a:spcAft>
-              <a:buFont typeface="Arial" panose="020B0604020202020204" pitchFamily="34" charset="0"/>
-              <a:buChar char="•"/>
-            </a:pPr>
-            <a:r>
-              <a:rPr lang="en-US" altLang="en-US" sz="3200" dirty="0">
-                <a:solidFill>
-                  <a:srgbClr val="1C1C1C"/>
-                </a:solidFill>
-                <a:latin typeface="Nourd-SemiBold" panose="01000000000000000000" charset="0"/>
-                <a:ea typeface="Nourd Bold" panose="00000800000000000000"/>
-                <a:cs typeface="Nourd-SemiBold" panose="01000000000000000000" charset="0"/>
-                <a:sym typeface="Nourd Bold" panose="00000800000000000000"/>
-              </a:rPr>
-              <a:t>Points that do not belong to any cluster are often considered outliers</a:t>
-            </a:r>
-            <a:endParaRPr lang="en-US" altLang="en-US" sz="3200" dirty="0">
-              <a:solidFill>
-                <a:srgbClr val="1C1C1C"/>
-              </a:solidFill>
-              <a:latin typeface="Nourd-SemiBold" panose="01000000000000000000" charset="0"/>
-              <a:ea typeface="Nourd Bold" panose="00000800000000000000"/>
-              <a:cs typeface="Nourd-SemiBold" panose="01000000000000000000" charset="0"/>
-              <a:sym typeface="Nourd Bold" panose="00000800000000000000"/>
-            </a:endParaRPr>
-          </a:p>
-        </p:txBody>
-      </p:sp>
       <p:pic>
         <p:nvPicPr>
           <p:cNvPr id="3" name="Picture 2"/>
@@ -4750,8 +4905,8 @@
         </p:blipFill>
         <p:spPr>
           <a:xfrm>
-            <a:off x="3920490" y="3835400"/>
-            <a:ext cx="10447020" cy="6106795"/>
+            <a:off x="838200" y="2476500"/>
+            <a:ext cx="16586200" cy="7002145"/>
           </a:xfrm>
           <a:prstGeom prst="rect">
             <a:avLst/>
@@ -4933,7 +5088,7 @@
                 <a:cs typeface="Nourd-SemiBold" panose="01000000000000000000" charset="0"/>
                 <a:sym typeface="Nourd Bold" panose="00000800000000000000"/>
               </a:rPr>
-              <a:t>Isolation Forest Method</a:t>
+              <a:t>Clustering Method</a:t>
             </a:r>
             <a:endParaRPr lang="en-US" sz="5400">
               <a:solidFill>
@@ -4956,7 +5111,7 @@
         <p:spPr>
           <a:xfrm>
             <a:off x="609600" y="2019300"/>
-            <a:ext cx="16817340" cy="2355850"/>
+            <a:ext cx="16817340" cy="1789430"/>
           </a:xfrm>
           <a:prstGeom prst="rect">
             <a:avLst/>
@@ -4991,7 +5146,7 @@
                 <a:cs typeface="Nourd-SemiBold" panose="01000000000000000000" charset="0"/>
                 <a:sym typeface="Nourd Bold" panose="00000800000000000000"/>
               </a:rPr>
-              <a:t>Based on principle: outliers are fewer and different</a:t>
+              <a:t>Clustering is the process of grouping data points together based on their similarity to each other</a:t>
             </a:r>
             <a:endParaRPr lang="en-US" altLang="en-US" sz="3200" dirty="0">
               <a:solidFill>
@@ -5027,7 +5182,7 @@
                 <a:cs typeface="Nourd-SemiBold" panose="01000000000000000000" charset="0"/>
                 <a:sym typeface="Nourd Bold" panose="00000800000000000000"/>
               </a:rPr>
-              <a:t>First, it randomly select an feature and splits between max and min values</a:t>
+              <a:t>Points that do not belong to any cluster are often considered outliers</a:t>
             </a:r>
             <a:endParaRPr lang="en-US" altLang="en-US" sz="3200" dirty="0">
               <a:solidFill>
@@ -5039,83 +5194,11 @@
               <a:sym typeface="Nourd Bold" panose="00000800000000000000"/>
             </a:endParaRPr>
           </a:p>
-          <a:p>
-            <a:pPr marL="571500" indent="-571500">
-              <a:lnSpc>
-                <a:spcPct val="115000"/>
-              </a:lnSpc>
-              <a:spcBef>
-                <a:spcPts val="0"/>
-              </a:spcBef>
-              <a:spcAft>
-                <a:spcPts val="0"/>
-              </a:spcAft>
-              <a:buFont typeface="Arial" panose="020B0604020202020204" pitchFamily="34" charset="0"/>
-              <a:buChar char="•"/>
-            </a:pPr>
-            <a:r>
-              <a:rPr lang="en-US" altLang="en-US" sz="3200" dirty="0">
-                <a:solidFill>
-                  <a:srgbClr val="1C1C1C"/>
-                </a:solidFill>
-                <a:latin typeface="Nourd-SemiBold" panose="01000000000000000000" charset="0"/>
-                <a:ea typeface="Nourd Bold" panose="00000800000000000000"/>
-                <a:cs typeface="Nourd-SemiBold" panose="01000000000000000000" charset="0"/>
-                <a:sym typeface="Nourd Bold" panose="00000800000000000000"/>
-              </a:rPr>
-              <a:t>It continues splitting recursively until all points are isolated</a:t>
-            </a:r>
-            <a:endParaRPr lang="en-US" altLang="en-US" sz="3200" dirty="0">
-              <a:solidFill>
-                <a:srgbClr val="1C1C1C"/>
-              </a:solidFill>
-              <a:latin typeface="Nourd-SemiBold" panose="01000000000000000000" charset="0"/>
-              <a:ea typeface="Nourd Bold" panose="00000800000000000000"/>
-              <a:cs typeface="Nourd-SemiBold" panose="01000000000000000000" charset="0"/>
-              <a:sym typeface="Nourd Bold" panose="00000800000000000000"/>
-            </a:endParaRPr>
-          </a:p>
-          <a:p>
-            <a:pPr marL="571500" indent="-571500">
-              <a:lnSpc>
-                <a:spcPct val="115000"/>
-              </a:lnSpc>
-              <a:spcBef>
-                <a:spcPts val="0"/>
-              </a:spcBef>
-              <a:spcAft>
-                <a:spcPts val="0"/>
-              </a:spcAft>
-              <a:buFont typeface="Arial" panose="020B0604020202020204" pitchFamily="34" charset="0"/>
-              <a:buChar char="•"/>
-            </a:pPr>
-            <a:r>
-              <a:rPr lang="en-US" altLang="en-US" sz="3200" dirty="0">
-                <a:solidFill>
-                  <a:srgbClr val="1C1C1C"/>
-                </a:solidFill>
-                <a:latin typeface="Nourd-SemiBold" panose="01000000000000000000" charset="0"/>
-                <a:ea typeface="Nourd Bold" panose="00000800000000000000"/>
-                <a:cs typeface="Nourd-SemiBold" panose="01000000000000000000" charset="0"/>
-                <a:sym typeface="Nourd Bold" panose="00000800000000000000"/>
-              </a:rPr>
-              <a:t>We can detect outliers as the points that require lesser splits</a:t>
-            </a:r>
-            <a:endParaRPr lang="en-US" altLang="en-US" sz="3200" dirty="0">
-              <a:solidFill>
-                <a:srgbClr val="1C1C1C"/>
-              </a:solidFill>
-              <a:latin typeface="Nourd-SemiBold" panose="01000000000000000000" charset="0"/>
-              <a:ea typeface="Nourd Bold" panose="00000800000000000000"/>
-              <a:cs typeface="Nourd-SemiBold" panose="01000000000000000000" charset="0"/>
-              <a:sym typeface="Nourd Bold" panose="00000800000000000000"/>
-            </a:endParaRPr>
-          </a:p>
         </p:txBody>
       </p:sp>
       <p:pic>
         <p:nvPicPr>
-          <p:cNvPr id="2" name="Picture 1"/>
+          <p:cNvPr id="3" name="Picture 2"/>
           <p:cNvPicPr>
             <a:picLocks noChangeAspect="1"/>
           </p:cNvPicPr>
@@ -5129,32 +5212,8 @@
         </p:blipFill>
         <p:spPr>
           <a:xfrm>
-            <a:off x="1371600" y="4457700"/>
-            <a:ext cx="15770225" cy="1638300"/>
-          </a:xfrm>
-          <a:prstGeom prst="rect">
-            <a:avLst/>
-          </a:prstGeom>
-        </p:spPr>
-      </p:pic>
-      <p:pic>
-        <p:nvPicPr>
-          <p:cNvPr id="7" name="Picture 6"/>
-          <p:cNvPicPr>
-            <a:picLocks noChangeAspect="1"/>
-          </p:cNvPicPr>
-          <p:nvPr/>
-        </p:nvPicPr>
-        <p:blipFill>
-          <a:blip r:embed="rId2"/>
-          <a:stretch>
-            <a:fillRect/>
-          </a:stretch>
-        </p:blipFill>
-        <p:spPr>
-          <a:xfrm>
-            <a:off x="1371600" y="6231890"/>
-            <a:ext cx="11668125" cy="3816985"/>
+            <a:off x="3920490" y="3835400"/>
+            <a:ext cx="10447020" cy="6106795"/>
           </a:xfrm>
           <a:prstGeom prst="rect">
             <a:avLst/>
@@ -5350,9 +5409,175 @@
           </a:p>
         </p:txBody>
       </p:sp>
+      <p:sp>
+        <p:nvSpPr>
+          <p:cNvPr id="5" name="Text Box 4"/>
+          <p:cNvSpPr txBox="1"/>
+          <p:nvPr/>
+        </p:nvSpPr>
+        <p:spPr>
+          <a:xfrm>
+            <a:off x="609600" y="2019300"/>
+            <a:ext cx="16817340" cy="2355850"/>
+          </a:xfrm>
+          <a:prstGeom prst="rect">
+            <a:avLst/>
+          </a:prstGeom>
+          <a:noFill/>
+        </p:spPr>
+        <p:txBody>
+          <a:bodyPr wrap="square" rtlCol="0" anchor="t">
+            <a:spAutoFit/>
+          </a:bodyPr>
+          <a:p>
+            <a:pPr marL="571500" indent="-571500">
+              <a:lnSpc>
+                <a:spcPct val="115000"/>
+              </a:lnSpc>
+              <a:spcBef>
+                <a:spcPts val="0"/>
+              </a:spcBef>
+              <a:spcAft>
+                <a:spcPts val="0"/>
+              </a:spcAft>
+              <a:buFont typeface="Arial" panose="020B0604020202020204" pitchFamily="34" charset="0"/>
+              <a:buChar char="•"/>
+            </a:pPr>
+            <a:r>
+              <a:rPr lang="en-US" altLang="en-US" sz="3200" dirty="0">
+                <a:solidFill>
+                  <a:srgbClr val="1C1C1C"/>
+                </a:solidFill>
+                <a:latin typeface="Nourd-SemiBold" panose="01000000000000000000" charset="0"/>
+                <a:ea typeface="Nourd Bold" panose="00000800000000000000"/>
+                <a:cs typeface="Nourd-SemiBold" panose="01000000000000000000" charset="0"/>
+                <a:sym typeface="Nourd Bold" panose="00000800000000000000"/>
+              </a:rPr>
+              <a:t>Based on principle: outliers are fewer and different</a:t>
+            </a:r>
+            <a:endParaRPr lang="en-US" altLang="en-US" sz="3200" dirty="0">
+              <a:solidFill>
+                <a:srgbClr val="1C1C1C"/>
+              </a:solidFill>
+              <a:latin typeface="Nourd-SemiBold" panose="01000000000000000000" charset="0"/>
+              <a:ea typeface="Nourd Bold" panose="00000800000000000000"/>
+              <a:cs typeface="Nourd-SemiBold" panose="01000000000000000000" charset="0"/>
+              <a:sym typeface="Nourd Bold" panose="00000800000000000000"/>
+            </a:endParaRPr>
+          </a:p>
+          <a:p>
+            <a:pPr marL="571500" indent="-571500">
+              <a:lnSpc>
+                <a:spcPct val="115000"/>
+              </a:lnSpc>
+              <a:spcBef>
+                <a:spcPts val="0"/>
+              </a:spcBef>
+              <a:spcAft>
+                <a:spcPts val="0"/>
+              </a:spcAft>
+              <a:buFont typeface="Arial" panose="020B0604020202020204" pitchFamily="34" charset="0"/>
+              <a:buChar char="•"/>
+            </a:pPr>
+            <a:r>
+              <a:rPr lang="en-US" altLang="en-US" sz="3200" dirty="0">
+                <a:solidFill>
+                  <a:srgbClr val="1C1C1C"/>
+                </a:solidFill>
+                <a:latin typeface="Nourd-SemiBold" panose="01000000000000000000" charset="0"/>
+                <a:ea typeface="Nourd Bold" panose="00000800000000000000"/>
+                <a:cs typeface="Nourd-SemiBold" panose="01000000000000000000" charset="0"/>
+                <a:sym typeface="Nourd Bold" panose="00000800000000000000"/>
+              </a:rPr>
+              <a:t>First, it randomly select an feature and splits between max and min values</a:t>
+            </a:r>
+            <a:endParaRPr lang="en-US" altLang="en-US" sz="3200" dirty="0">
+              <a:solidFill>
+                <a:srgbClr val="1C1C1C"/>
+              </a:solidFill>
+              <a:latin typeface="Nourd-SemiBold" panose="01000000000000000000" charset="0"/>
+              <a:ea typeface="Nourd Bold" panose="00000800000000000000"/>
+              <a:cs typeface="Nourd-SemiBold" panose="01000000000000000000" charset="0"/>
+              <a:sym typeface="Nourd Bold" panose="00000800000000000000"/>
+            </a:endParaRPr>
+          </a:p>
+          <a:p>
+            <a:pPr marL="571500" indent="-571500">
+              <a:lnSpc>
+                <a:spcPct val="115000"/>
+              </a:lnSpc>
+              <a:spcBef>
+                <a:spcPts val="0"/>
+              </a:spcBef>
+              <a:spcAft>
+                <a:spcPts val="0"/>
+              </a:spcAft>
+              <a:buFont typeface="Arial" panose="020B0604020202020204" pitchFamily="34" charset="0"/>
+              <a:buChar char="•"/>
+            </a:pPr>
+            <a:r>
+              <a:rPr lang="en-US" altLang="en-US" sz="3200" dirty="0">
+                <a:solidFill>
+                  <a:srgbClr val="1C1C1C"/>
+                </a:solidFill>
+                <a:latin typeface="Nourd-SemiBold" panose="01000000000000000000" charset="0"/>
+                <a:ea typeface="Nourd Bold" panose="00000800000000000000"/>
+                <a:cs typeface="Nourd-SemiBold" panose="01000000000000000000" charset="0"/>
+                <a:sym typeface="Nourd Bold" panose="00000800000000000000"/>
+              </a:rPr>
+              <a:t>It continues splitting recursively until all points are isolated</a:t>
+            </a:r>
+            <a:endParaRPr lang="en-US" altLang="en-US" sz="3200" dirty="0">
+              <a:solidFill>
+                <a:srgbClr val="1C1C1C"/>
+              </a:solidFill>
+              <a:latin typeface="Nourd-SemiBold" panose="01000000000000000000" charset="0"/>
+              <a:ea typeface="Nourd Bold" panose="00000800000000000000"/>
+              <a:cs typeface="Nourd-SemiBold" panose="01000000000000000000" charset="0"/>
+              <a:sym typeface="Nourd Bold" panose="00000800000000000000"/>
+            </a:endParaRPr>
+          </a:p>
+          <a:p>
+            <a:pPr marL="571500" indent="-571500">
+              <a:lnSpc>
+                <a:spcPct val="115000"/>
+              </a:lnSpc>
+              <a:spcBef>
+                <a:spcPts val="0"/>
+              </a:spcBef>
+              <a:spcAft>
+                <a:spcPts val="0"/>
+              </a:spcAft>
+              <a:buFont typeface="Arial" panose="020B0604020202020204" pitchFamily="34" charset="0"/>
+              <a:buChar char="•"/>
+            </a:pPr>
+            <a:r>
+              <a:rPr lang="en-US" altLang="en-US" sz="3200" dirty="0">
+                <a:solidFill>
+                  <a:srgbClr val="1C1C1C"/>
+                </a:solidFill>
+                <a:latin typeface="Nourd-SemiBold" panose="01000000000000000000" charset="0"/>
+                <a:ea typeface="Nourd Bold" panose="00000800000000000000"/>
+                <a:cs typeface="Nourd-SemiBold" panose="01000000000000000000" charset="0"/>
+                <a:sym typeface="Nourd Bold" panose="00000800000000000000"/>
+              </a:rPr>
+              <a:t>We can detect outliers as the points that require lesser splits</a:t>
+            </a:r>
+            <a:endParaRPr lang="en-US" altLang="en-US" sz="3200" dirty="0">
+              <a:solidFill>
+                <a:srgbClr val="1C1C1C"/>
+              </a:solidFill>
+              <a:latin typeface="Nourd-SemiBold" panose="01000000000000000000" charset="0"/>
+              <a:ea typeface="Nourd Bold" panose="00000800000000000000"/>
+              <a:cs typeface="Nourd-SemiBold" panose="01000000000000000000" charset="0"/>
+              <a:sym typeface="Nourd Bold" panose="00000800000000000000"/>
+            </a:endParaRPr>
+          </a:p>
+        </p:txBody>
+      </p:sp>
       <p:pic>
         <p:nvPicPr>
-          <p:cNvPr id="3" name="Picture 2"/>
+          <p:cNvPr id="2" name="Picture 1"/>
           <p:cNvPicPr>
             <a:picLocks noChangeAspect="1"/>
           </p:cNvPicPr>
@@ -5366,8 +5591,32 @@
         </p:blipFill>
         <p:spPr>
           <a:xfrm>
-            <a:off x="2133600" y="2209800"/>
-            <a:ext cx="14441170" cy="7513320"/>
+            <a:off x="1371600" y="4457700"/>
+            <a:ext cx="15770225" cy="1638300"/>
+          </a:xfrm>
+          <a:prstGeom prst="rect">
+            <a:avLst/>
+          </a:prstGeom>
+        </p:spPr>
+      </p:pic>
+      <p:pic>
+        <p:nvPicPr>
+          <p:cNvPr id="7" name="Picture 6"/>
+          <p:cNvPicPr>
+            <a:picLocks noChangeAspect="1"/>
+          </p:cNvPicPr>
+          <p:nvPr/>
+        </p:nvPicPr>
+        <p:blipFill>
+          <a:blip r:embed="rId2"/>
+          <a:stretch>
+            <a:fillRect/>
+          </a:stretch>
+        </p:blipFill>
+        <p:spPr>
+          <a:xfrm>
+            <a:off x="1371600" y="6231890"/>
+            <a:ext cx="11668125" cy="3816985"/>
           </a:xfrm>
           <a:prstGeom prst="rect">
             <a:avLst/>
@@ -5540,18 +5789,18 @@
               </a:lnSpc>
             </a:pPr>
             <a:r>
-              <a:rPr lang="en-US" altLang="en-US" sz="5400">
+              <a:rPr lang="en-US" altLang="en-US" sz="5400" dirty="0">
                 <a:solidFill>
                   <a:srgbClr val="1C1C1C"/>
                 </a:solidFill>
-                <a:latin typeface="Nourd-Bold" panose="01000000000000000000" charset="0"/>
-                <a:ea typeface="Hatton Ultra-Bold" panose="00000900000000000000"/>
-                <a:cs typeface="Nourd-Bold" panose="01000000000000000000" charset="0"/>
-                <a:sym typeface="Hatton Ultra-Bold" panose="00000900000000000000"/>
+                <a:latin typeface="Nourd-SemiBold" panose="01000000000000000000" charset="0"/>
+                <a:ea typeface="Nourd Bold" panose="00000800000000000000"/>
+                <a:cs typeface="Nourd-SemiBold" panose="01000000000000000000" charset="0"/>
+                <a:sym typeface="Nourd Bold" panose="00000800000000000000"/>
               </a:rPr>
-              <a:t>Local Outlier Factor (LOF) Method</a:t>
-            </a:r>
-            <a:endParaRPr lang="en-US" altLang="en-US" sz="5400">
+              <a:t>Isolation Forest Method</a:t>
+            </a:r>
+            <a:endParaRPr lang="en-US" sz="5400">
               <a:solidFill>
                 <a:srgbClr val="1C1C1C"/>
               </a:solidFill>
@@ -5563,163 +5812,9 @@
           </a:p>
         </p:txBody>
       </p:sp>
-      <p:sp>
-        <p:nvSpPr>
-          <p:cNvPr id="5" name="Text Box 4"/>
-          <p:cNvSpPr txBox="1"/>
-          <p:nvPr/>
-        </p:nvSpPr>
-        <p:spPr>
-          <a:xfrm>
-            <a:off x="609600" y="2019300"/>
-            <a:ext cx="16817340" cy="1789430"/>
-          </a:xfrm>
-          <a:prstGeom prst="rect">
-            <a:avLst/>
-          </a:prstGeom>
-          <a:noFill/>
-        </p:spPr>
-        <p:txBody>
-          <a:bodyPr wrap="square" rtlCol="0" anchor="t">
-            <a:spAutoFit/>
-          </a:bodyPr>
-          <a:p>
-            <a:pPr marL="571500" indent="-571500">
-              <a:lnSpc>
-                <a:spcPct val="115000"/>
-              </a:lnSpc>
-              <a:spcBef>
-                <a:spcPts val="0"/>
-              </a:spcBef>
-              <a:spcAft>
-                <a:spcPts val="0"/>
-              </a:spcAft>
-              <a:buFont typeface="Arial" panose="020B0604020202020204" pitchFamily="34" charset="0"/>
-              <a:buChar char="•"/>
-            </a:pPr>
-            <a:r>
-              <a:rPr lang="en-US" altLang="en-US" sz="3200" dirty="0">
-                <a:solidFill>
-                  <a:srgbClr val="1C1C1C"/>
-                </a:solidFill>
-                <a:latin typeface="Nourd-SemiBold" panose="01000000000000000000" charset="0"/>
-                <a:ea typeface="Nourd Bold" panose="00000800000000000000"/>
-                <a:cs typeface="Nourd-SemiBold" panose="01000000000000000000" charset="0"/>
-                <a:sym typeface="Nourd Bold" panose="00000800000000000000"/>
-              </a:rPr>
-              <a:t>Density-based method</a:t>
-            </a:r>
-            <a:endParaRPr lang="en-US" altLang="en-US" sz="3200" dirty="0">
-              <a:solidFill>
-                <a:srgbClr val="1C1C1C"/>
-              </a:solidFill>
-              <a:latin typeface="Nourd-SemiBold" panose="01000000000000000000" charset="0"/>
-              <a:ea typeface="Nourd Bold" panose="00000800000000000000"/>
-              <a:cs typeface="Nourd-SemiBold" panose="01000000000000000000" charset="0"/>
-              <a:sym typeface="Nourd Bold" panose="00000800000000000000"/>
-            </a:endParaRPr>
-          </a:p>
-          <a:p>
-            <a:pPr marL="571500" indent="-571500">
-              <a:lnSpc>
-                <a:spcPct val="115000"/>
-              </a:lnSpc>
-              <a:spcBef>
-                <a:spcPts val="0"/>
-              </a:spcBef>
-              <a:spcAft>
-                <a:spcPts val="0"/>
-              </a:spcAft>
-              <a:buFont typeface="Arial" panose="020B0604020202020204" pitchFamily="34" charset="0"/>
-              <a:buChar char="•"/>
-            </a:pPr>
-            <a:r>
-              <a:rPr lang="en-US" altLang="en-US" sz="3200" dirty="0">
-                <a:solidFill>
-                  <a:srgbClr val="1C1C1C"/>
-                </a:solidFill>
-                <a:latin typeface="Nourd-SemiBold" panose="01000000000000000000" charset="0"/>
-                <a:ea typeface="Nourd Bold" panose="00000800000000000000"/>
-                <a:cs typeface="Nourd-SemiBold" panose="01000000000000000000" charset="0"/>
-                <a:sym typeface="Nourd Bold" panose="00000800000000000000"/>
-              </a:rPr>
-              <a:t>It measures the local density of a data point compared to its neighbors</a:t>
-            </a:r>
-            <a:endParaRPr lang="en-US" altLang="en-US" sz="3200" dirty="0">
-              <a:solidFill>
-                <a:srgbClr val="1C1C1C"/>
-              </a:solidFill>
-              <a:latin typeface="Nourd-SemiBold" panose="01000000000000000000" charset="0"/>
-              <a:ea typeface="Nourd Bold" panose="00000800000000000000"/>
-              <a:cs typeface="Nourd-SemiBold" panose="01000000000000000000" charset="0"/>
-              <a:sym typeface="Nourd Bold" panose="00000800000000000000"/>
-            </a:endParaRPr>
-          </a:p>
-          <a:p>
-            <a:pPr marL="571500" indent="-571500">
-              <a:lnSpc>
-                <a:spcPct val="115000"/>
-              </a:lnSpc>
-              <a:spcBef>
-                <a:spcPts val="0"/>
-              </a:spcBef>
-              <a:spcAft>
-                <a:spcPts val="0"/>
-              </a:spcAft>
-              <a:buFont typeface="Arial" panose="020B0604020202020204" pitchFamily="34" charset="0"/>
-              <a:buChar char="•"/>
-            </a:pPr>
-            <a:r>
-              <a:rPr lang="en-US" altLang="en-US" sz="3200" dirty="0">
-                <a:solidFill>
-                  <a:srgbClr val="1C1C1C"/>
-                </a:solidFill>
-                <a:latin typeface="Nourd-SemiBold" panose="01000000000000000000" charset="0"/>
-                <a:ea typeface="Nourd Bold" panose="00000800000000000000"/>
-                <a:cs typeface="Nourd-SemiBold" panose="01000000000000000000" charset="0"/>
-                <a:sym typeface="Nourd Bold" panose="00000800000000000000"/>
-              </a:rPr>
-              <a:t>O</a:t>
-            </a:r>
-            <a:r>
-              <a:rPr lang="en-US" altLang="en-US" sz="3200" dirty="0">
-                <a:solidFill>
-                  <a:srgbClr val="1C1C1C"/>
-                </a:solidFill>
-                <a:latin typeface="Nourd-SemiBold" panose="01000000000000000000" charset="0"/>
-                <a:ea typeface="Nourd Bold" panose="00000800000000000000"/>
-                <a:cs typeface="Nourd-SemiBold" panose="01000000000000000000" charset="0"/>
-                <a:sym typeface="Nourd Bold" panose="00000800000000000000"/>
-              </a:rPr>
-              <a:t>utliers = </a:t>
-            </a:r>
-            <a:r>
-              <a:rPr lang="en-US" altLang="en-US" sz="3200" dirty="0">
-                <a:solidFill>
-                  <a:srgbClr val="1C1C1C"/>
-                </a:solidFill>
-                <a:latin typeface="Nourd-SemiBold" panose="01000000000000000000" charset="0"/>
-                <a:ea typeface="Nourd Bold" panose="00000800000000000000"/>
-                <a:cs typeface="Nourd-SemiBold" panose="01000000000000000000" charset="0"/>
-                <a:sym typeface="Nourd Bold" panose="00000800000000000000"/>
-              </a:rPr>
-              <a:t>data points with significantly lower density than their neighbors </a:t>
-            </a:r>
-            <a:endParaRPr lang="en-US" altLang="en-US" sz="3200" dirty="0">
-              <a:solidFill>
-                <a:srgbClr val="1C1C1C"/>
-              </a:solidFill>
-              <a:latin typeface="Nourd-SemiBold" panose="01000000000000000000" charset="0"/>
-              <a:ea typeface="Nourd Bold" panose="00000800000000000000"/>
-              <a:cs typeface="Nourd-SemiBold" panose="01000000000000000000" charset="0"/>
-              <a:sym typeface="Nourd Bold" panose="00000800000000000000"/>
-            </a:endParaRPr>
-          </a:p>
-        </p:txBody>
-      </p:sp>
       <p:pic>
         <p:nvPicPr>
-          <p:cNvPr id="4" name="Picture 3"/>
+          <p:cNvPr id="3" name="Picture 2"/>
           <p:cNvPicPr>
             <a:picLocks noChangeAspect="1"/>
           </p:cNvPicPr>
@@ -5733,8 +5828,8 @@
         </p:blipFill>
         <p:spPr>
           <a:xfrm>
-            <a:off x="4105910" y="3848100"/>
-            <a:ext cx="10075545" cy="6188710"/>
+            <a:off x="2133600" y="2209800"/>
+            <a:ext cx="14441170" cy="7513320"/>
           </a:xfrm>
           <a:prstGeom prst="rect">
             <a:avLst/>
@@ -5916,6 +6011,373 @@
                 <a:cs typeface="Nourd-Bold" panose="01000000000000000000" charset="0"/>
                 <a:sym typeface="Hatton Ultra-Bold" panose="00000900000000000000"/>
               </a:rPr>
+              <a:t>Local Outlier Factor (LOF) Method</a:t>
+            </a:r>
+            <a:endParaRPr lang="en-US" altLang="en-US" sz="5400">
+              <a:solidFill>
+                <a:srgbClr val="1C1C1C"/>
+              </a:solidFill>
+              <a:latin typeface="Nourd-Bold" panose="01000000000000000000" charset="0"/>
+              <a:ea typeface="Hatton Ultra-Bold" panose="00000900000000000000"/>
+              <a:cs typeface="Nourd-Bold" panose="01000000000000000000" charset="0"/>
+              <a:sym typeface="Hatton Ultra-Bold" panose="00000900000000000000"/>
+            </a:endParaRPr>
+          </a:p>
+        </p:txBody>
+      </p:sp>
+      <p:sp>
+        <p:nvSpPr>
+          <p:cNvPr id="5" name="Text Box 4"/>
+          <p:cNvSpPr txBox="1"/>
+          <p:nvPr/>
+        </p:nvSpPr>
+        <p:spPr>
+          <a:xfrm>
+            <a:off x="609600" y="2019300"/>
+            <a:ext cx="16817340" cy="1789430"/>
+          </a:xfrm>
+          <a:prstGeom prst="rect">
+            <a:avLst/>
+          </a:prstGeom>
+          <a:noFill/>
+        </p:spPr>
+        <p:txBody>
+          <a:bodyPr wrap="square" rtlCol="0" anchor="t">
+            <a:spAutoFit/>
+          </a:bodyPr>
+          <a:p>
+            <a:pPr marL="571500" indent="-571500">
+              <a:lnSpc>
+                <a:spcPct val="115000"/>
+              </a:lnSpc>
+              <a:spcBef>
+                <a:spcPts val="0"/>
+              </a:spcBef>
+              <a:spcAft>
+                <a:spcPts val="0"/>
+              </a:spcAft>
+              <a:buFont typeface="Arial" panose="020B0604020202020204" pitchFamily="34" charset="0"/>
+              <a:buChar char="•"/>
+            </a:pPr>
+            <a:r>
+              <a:rPr lang="en-US" altLang="en-US" sz="3200" dirty="0">
+                <a:solidFill>
+                  <a:srgbClr val="1C1C1C"/>
+                </a:solidFill>
+                <a:latin typeface="Nourd-SemiBold" panose="01000000000000000000" charset="0"/>
+                <a:ea typeface="Nourd Bold" panose="00000800000000000000"/>
+                <a:cs typeface="Nourd-SemiBold" panose="01000000000000000000" charset="0"/>
+                <a:sym typeface="Nourd Bold" panose="00000800000000000000"/>
+              </a:rPr>
+              <a:t>Density-based method</a:t>
+            </a:r>
+            <a:endParaRPr lang="en-US" altLang="en-US" sz="3200" dirty="0">
+              <a:solidFill>
+                <a:srgbClr val="1C1C1C"/>
+              </a:solidFill>
+              <a:latin typeface="Nourd-SemiBold" panose="01000000000000000000" charset="0"/>
+              <a:ea typeface="Nourd Bold" panose="00000800000000000000"/>
+              <a:cs typeface="Nourd-SemiBold" panose="01000000000000000000" charset="0"/>
+              <a:sym typeface="Nourd Bold" panose="00000800000000000000"/>
+            </a:endParaRPr>
+          </a:p>
+          <a:p>
+            <a:pPr marL="571500" indent="-571500">
+              <a:lnSpc>
+                <a:spcPct val="115000"/>
+              </a:lnSpc>
+              <a:spcBef>
+                <a:spcPts val="0"/>
+              </a:spcBef>
+              <a:spcAft>
+                <a:spcPts val="0"/>
+              </a:spcAft>
+              <a:buFont typeface="Arial" panose="020B0604020202020204" pitchFamily="34" charset="0"/>
+              <a:buChar char="•"/>
+            </a:pPr>
+            <a:r>
+              <a:rPr lang="en-US" altLang="en-US" sz="3200" dirty="0">
+                <a:solidFill>
+                  <a:srgbClr val="1C1C1C"/>
+                </a:solidFill>
+                <a:latin typeface="Nourd-SemiBold" panose="01000000000000000000" charset="0"/>
+                <a:ea typeface="Nourd Bold" panose="00000800000000000000"/>
+                <a:cs typeface="Nourd-SemiBold" panose="01000000000000000000" charset="0"/>
+                <a:sym typeface="Nourd Bold" panose="00000800000000000000"/>
+              </a:rPr>
+              <a:t>It measures the local density of a data point compared to its neighbors</a:t>
+            </a:r>
+            <a:endParaRPr lang="en-US" altLang="en-US" sz="3200" dirty="0">
+              <a:solidFill>
+                <a:srgbClr val="1C1C1C"/>
+              </a:solidFill>
+              <a:latin typeface="Nourd-SemiBold" panose="01000000000000000000" charset="0"/>
+              <a:ea typeface="Nourd Bold" panose="00000800000000000000"/>
+              <a:cs typeface="Nourd-SemiBold" panose="01000000000000000000" charset="0"/>
+              <a:sym typeface="Nourd Bold" panose="00000800000000000000"/>
+            </a:endParaRPr>
+          </a:p>
+          <a:p>
+            <a:pPr marL="571500" indent="-571500">
+              <a:lnSpc>
+                <a:spcPct val="115000"/>
+              </a:lnSpc>
+              <a:spcBef>
+                <a:spcPts val="0"/>
+              </a:spcBef>
+              <a:spcAft>
+                <a:spcPts val="0"/>
+              </a:spcAft>
+              <a:buFont typeface="Arial" panose="020B0604020202020204" pitchFamily="34" charset="0"/>
+              <a:buChar char="•"/>
+            </a:pPr>
+            <a:r>
+              <a:rPr lang="en-US" altLang="en-US" sz="3200" dirty="0">
+                <a:solidFill>
+                  <a:srgbClr val="1C1C1C"/>
+                </a:solidFill>
+                <a:latin typeface="Nourd-SemiBold" panose="01000000000000000000" charset="0"/>
+                <a:ea typeface="Nourd Bold" panose="00000800000000000000"/>
+                <a:cs typeface="Nourd-SemiBold" panose="01000000000000000000" charset="0"/>
+                <a:sym typeface="Nourd Bold" panose="00000800000000000000"/>
+              </a:rPr>
+              <a:t>O</a:t>
+            </a:r>
+            <a:r>
+              <a:rPr lang="en-US" altLang="en-US" sz="3200" dirty="0">
+                <a:solidFill>
+                  <a:srgbClr val="1C1C1C"/>
+                </a:solidFill>
+                <a:latin typeface="Nourd-SemiBold" panose="01000000000000000000" charset="0"/>
+                <a:ea typeface="Nourd Bold" panose="00000800000000000000"/>
+                <a:cs typeface="Nourd-SemiBold" panose="01000000000000000000" charset="0"/>
+                <a:sym typeface="Nourd Bold" panose="00000800000000000000"/>
+              </a:rPr>
+              <a:t>utliers = </a:t>
+            </a:r>
+            <a:r>
+              <a:rPr lang="en-US" altLang="en-US" sz="3200" dirty="0">
+                <a:solidFill>
+                  <a:srgbClr val="1C1C1C"/>
+                </a:solidFill>
+                <a:latin typeface="Nourd-SemiBold" panose="01000000000000000000" charset="0"/>
+                <a:ea typeface="Nourd Bold" panose="00000800000000000000"/>
+                <a:cs typeface="Nourd-SemiBold" panose="01000000000000000000" charset="0"/>
+                <a:sym typeface="Nourd Bold" panose="00000800000000000000"/>
+              </a:rPr>
+              <a:t>data points with significantly lower density than their neighbors </a:t>
+            </a:r>
+            <a:endParaRPr lang="en-US" altLang="en-US" sz="3200" dirty="0">
+              <a:solidFill>
+                <a:srgbClr val="1C1C1C"/>
+              </a:solidFill>
+              <a:latin typeface="Nourd-SemiBold" panose="01000000000000000000" charset="0"/>
+              <a:ea typeface="Nourd Bold" panose="00000800000000000000"/>
+              <a:cs typeface="Nourd-SemiBold" panose="01000000000000000000" charset="0"/>
+              <a:sym typeface="Nourd Bold" panose="00000800000000000000"/>
+            </a:endParaRPr>
+          </a:p>
+        </p:txBody>
+      </p:sp>
+      <p:pic>
+        <p:nvPicPr>
+          <p:cNvPr id="4" name="Picture 3"/>
+          <p:cNvPicPr>
+            <a:picLocks noChangeAspect="1"/>
+          </p:cNvPicPr>
+          <p:nvPr/>
+        </p:nvPicPr>
+        <p:blipFill>
+          <a:blip r:embed="rId1"/>
+          <a:stretch>
+            <a:fillRect/>
+          </a:stretch>
+        </p:blipFill>
+        <p:spPr>
+          <a:xfrm>
+            <a:off x="4105910" y="3848100"/>
+            <a:ext cx="10075545" cy="6188710"/>
+          </a:xfrm>
+          <a:prstGeom prst="rect">
+            <a:avLst/>
+          </a:prstGeom>
+        </p:spPr>
+      </p:pic>
+    </p:spTree>
+  </p:cSld>
+  <p:clrMapOvr>
+    <a:masterClrMapping/>
+  </p:clrMapOvr>
+</p:sld>
+</file>
+
+<file path=ppt/slides/slide18.xml><?xml version="1.0" encoding="utf-8"?>
+<p:sld xmlns:a="http://schemas.openxmlformats.org/drawingml/2006/main" xmlns:r="http://schemas.openxmlformats.org/officeDocument/2006/relationships" xmlns:p="http://schemas.openxmlformats.org/presentationml/2006/main">
+  <p:cSld>
+    <p:bg>
+      <p:bgPr>
+        <a:solidFill>
+          <a:srgbClr val="EFEAD8"/>
+        </a:solidFill>
+        <a:effectLst/>
+      </p:bgPr>
+    </p:bg>
+    <p:spTree>
+      <p:nvGrpSpPr>
+        <p:cNvPr id="1" name=""/>
+        <p:cNvGrpSpPr/>
+        <p:nvPr/>
+      </p:nvGrpSpPr>
+      <p:grpSpPr>
+        <a:xfrm>
+          <a:off x="0" y="0"/>
+          <a:ext cx="0" cy="0"/>
+          <a:chOff x="0" y="0"/>
+          <a:chExt cx="0" cy="0"/>
+        </a:xfrm>
+      </p:grpSpPr>
+      <p:sp>
+        <p:nvSpPr>
+          <p:cNvPr id="21" name="AutoShape 21"/>
+          <p:cNvSpPr/>
+          <p:nvPr/>
+        </p:nvSpPr>
+        <p:spPr>
+          <a:xfrm>
+            <a:off x="27940" y="914400"/>
+            <a:ext cx="16788385" cy="12065"/>
+          </a:xfrm>
+          <a:prstGeom prst="line">
+            <a:avLst/>
+          </a:prstGeom>
+          <a:ln w="57150" cap="flat">
+            <a:solidFill>
+              <a:srgbClr val="1C1C1C"/>
+            </a:solidFill>
+            <a:prstDash val="solid"/>
+            <a:headEnd type="none" w="sm" len="sm"/>
+            <a:tailEnd type="none" w="sm" len="sm"/>
+          </a:ln>
+        </p:spPr>
+      </p:sp>
+      <p:sp>
+        <p:nvSpPr>
+          <p:cNvPr id="14" name="Freeform 14"/>
+          <p:cNvSpPr/>
+          <p:nvPr/>
+        </p:nvSpPr>
+        <p:spPr>
+          <a:xfrm>
+            <a:off x="16339820" y="448056"/>
+            <a:ext cx="1407795" cy="953770"/>
+          </a:xfrm>
+          <a:prstGeom prst="flowChartDisplay">
+            <a:avLst/>
+          </a:prstGeom>
+          <a:solidFill>
+            <a:srgbClr val="EFEAD8"/>
+          </a:solidFill>
+          <a:ln w="57150" cap="rnd">
+            <a:solidFill>
+              <a:srgbClr val="1C1C1C"/>
+            </a:solidFill>
+            <a:prstDash val="solid"/>
+            <a:round/>
+          </a:ln>
+        </p:spPr>
+      </p:sp>
+      <p:sp>
+        <p:nvSpPr>
+          <p:cNvPr id="19" name="TextBox 19"/>
+          <p:cNvSpPr txBox="1"/>
+          <p:nvPr/>
+        </p:nvSpPr>
+        <p:spPr>
+          <a:xfrm>
+            <a:off x="16535400" y="571500"/>
+            <a:ext cx="1043940" cy="647700"/>
+          </a:xfrm>
+          <a:prstGeom prst="rect">
+            <a:avLst/>
+          </a:prstGeom>
+        </p:spPr>
+        <p:txBody>
+          <a:bodyPr wrap="square" lIns="0" tIns="0" rIns="0" bIns="0" rtlCol="0" anchor="b" anchorCtr="0">
+            <a:noAutofit/>
+          </a:bodyPr>
+          <a:lstStyle/>
+          <a:p>
+            <a:pPr algn="ctr">
+              <a:lnSpc>
+                <a:spcPct val="100000"/>
+              </a:lnSpc>
+              <a:spcBef>
+                <a:spcPts val="0"/>
+              </a:spcBef>
+              <a:spcAft>
+                <a:spcPts val="0"/>
+              </a:spcAft>
+            </a:pPr>
+            <a:r>
+              <a:rPr lang="en-US" sz="4000">
+                <a:solidFill>
+                  <a:srgbClr val="1C1C1C"/>
+                </a:solidFill>
+                <a:latin typeface="Nourd-Bold" panose="01000000000000000000" charset="0"/>
+                <a:ea typeface="Nourd Bold" panose="00000800000000000000"/>
+                <a:cs typeface="Nourd-Bold" panose="01000000000000000000" charset="0"/>
+                <a:sym typeface="Nourd Bold" panose="00000800000000000000"/>
+              </a:rPr>
+              <a:t>10</a:t>
+            </a:r>
+            <a:endParaRPr lang="en-US" sz="4000">
+              <a:solidFill>
+                <a:srgbClr val="1C1C1C"/>
+              </a:solidFill>
+              <a:latin typeface="Nourd-Bold" panose="01000000000000000000" charset="0"/>
+              <a:ea typeface="Nourd Bold" panose="00000800000000000000"/>
+              <a:cs typeface="Nourd-Bold" panose="01000000000000000000" charset="0"/>
+              <a:sym typeface="Nourd Bold" panose="00000800000000000000"/>
+            </a:endParaRPr>
+          </a:p>
+        </p:txBody>
+      </p:sp>
+      <p:sp>
+        <p:nvSpPr>
+          <p:cNvPr id="6" name="TextBox 2"/>
+          <p:cNvSpPr txBox="1"/>
+          <p:nvPr/>
+        </p:nvSpPr>
+        <p:spPr>
+          <a:xfrm>
+            <a:off x="27940" y="1085850"/>
+            <a:ext cx="18367375" cy="830580"/>
+          </a:xfrm>
+          <a:prstGeom prst="rect">
+            <a:avLst/>
+          </a:prstGeom>
+        </p:spPr>
+        <p:txBody>
+          <a:bodyPr wrap="square" lIns="0" tIns="0" rIns="0" bIns="0" rtlCol="0" anchor="b" anchorCtr="0">
+            <a:spAutoFit/>
+          </a:bodyPr>
+          <a:lstStyle/>
+          <a:p>
+            <a:pPr algn="ctr">
+              <a:lnSpc>
+                <a:spcPct val="100000"/>
+              </a:lnSpc>
+            </a:pPr>
+            <a:r>
+              <a:rPr lang="en-US" altLang="en-US" sz="5400">
+                <a:solidFill>
+                  <a:srgbClr val="1C1C1C"/>
+                </a:solidFill>
+                <a:latin typeface="Nourd-Bold" panose="01000000000000000000" charset="0"/>
+                <a:ea typeface="Hatton Ultra-Bold" panose="00000900000000000000"/>
+                <a:cs typeface="Nourd-Bold" panose="01000000000000000000" charset="0"/>
+                <a:sym typeface="Hatton Ultra-Bold" panose="00000900000000000000"/>
+              </a:rPr>
               <a:t>Applications of Outlier Detection</a:t>
             </a:r>
             <a:endParaRPr lang="en-US" altLang="en-US" sz="5400">
@@ -6248,7 +6710,7 @@
 </p:sld>
 </file>
 
-<file path=ppt/slides/slide18.xml><?xml version="1.0" encoding="utf-8"?>
+<file path=ppt/slides/slide19.xml><?xml version="1.0" encoding="utf-8"?>
 <p:sld xmlns:a="http://schemas.openxmlformats.org/drawingml/2006/main" xmlns:r="http://schemas.openxmlformats.org/officeDocument/2006/relationships" xmlns:p="http://schemas.openxmlformats.org/presentationml/2006/main">
   <p:cSld>
     <p:bg>
@@ -9571,7 +10033,7 @@
                 <a:cs typeface="Nourd-SemiBold" panose="01000000000000000000" charset="0"/>
                 <a:sym typeface="Nourd Bold" panose="00000800000000000000"/>
               </a:rPr>
-              <a:t>irregularities </a:t>
+              <a:t>irregularities / anomalies</a:t>
             </a:r>
             <a:endParaRPr lang="en-US" altLang="en-US" sz="3600" dirty="0">
               <a:solidFill>
@@ -9630,7 +10092,7 @@
         <p:spPr>
           <a:xfrm>
             <a:off x="609600" y="4084955"/>
-            <a:ext cx="8984615" cy="4761865"/>
+            <a:ext cx="8984615" cy="5184775"/>
           </a:xfrm>
           <a:prstGeom prst="rect">
             <a:avLst/>
@@ -9656,7 +10118,7 @@
               <a:buNone/>
             </a:pPr>
             <a:r>
-              <a:rPr lang="en-US" altLang="en-US" sz="3200" dirty="0">
+              <a:rPr lang="en-US" altLang="en-US" sz="3600" dirty="0">
                 <a:solidFill>
                   <a:srgbClr val="1C1C1C"/>
                 </a:solidFill>
@@ -9667,7 +10129,7 @@
               </a:rPr>
               <a:t>Causes:</a:t>
             </a:r>
-            <a:endParaRPr lang="en-US" altLang="en-US" sz="3200" dirty="0">
+            <a:endParaRPr lang="en-US" altLang="en-US" sz="3600" dirty="0">
               <a:solidFill>
                 <a:srgbClr val="1C1C1C"/>
               </a:solidFill>
@@ -9692,7 +10154,7 @@
               <a:buChar char="•"/>
             </a:pPr>
             <a:r>
-              <a:rPr lang="en-US" altLang="en-US" sz="3200" dirty="0">
+              <a:rPr lang="en-US" altLang="en-US" sz="3600" dirty="0">
                 <a:solidFill>
                   <a:srgbClr val="1C1C1C"/>
                 </a:solidFill>
@@ -9703,7 +10165,7 @@
               </a:rPr>
               <a:t>measurement errors</a:t>
             </a:r>
-            <a:endParaRPr lang="en-US" altLang="en-US" sz="3200" dirty="0">
+            <a:endParaRPr lang="en-US" altLang="en-US" sz="3600" dirty="0">
               <a:solidFill>
                 <a:srgbClr val="1C1C1C"/>
               </a:solidFill>
@@ -9728,7 +10190,7 @@
               <a:buChar char="•"/>
             </a:pPr>
             <a:r>
-              <a:rPr lang="en-US" altLang="en-US" sz="3200" dirty="0">
+              <a:rPr lang="en-US" altLang="en-US" sz="3600" dirty="0">
                 <a:solidFill>
                   <a:srgbClr val="1C1C1C"/>
                 </a:solidFill>
@@ -9737,9 +10199,9 @@
                 <a:cs typeface="Nourd-SemiBold" panose="01000000000000000000" charset="0"/>
                 <a:sym typeface="Nourd Bold" panose="00000800000000000000"/>
               </a:rPr>
-              <a:t>fraud detection</a:t>
-            </a:r>
-            <a:endParaRPr lang="en-US" altLang="en-US" sz="3200" dirty="0">
+              <a:t>data entry error</a:t>
+            </a:r>
+            <a:endParaRPr lang="en-US" altLang="en-US" sz="3600" dirty="0">
               <a:solidFill>
                 <a:srgbClr val="1C1C1C"/>
               </a:solidFill>
@@ -9764,7 +10226,7 @@
               <a:buChar char="•"/>
             </a:pPr>
             <a:r>
-              <a:rPr lang="en-US" altLang="en-US" sz="3200" dirty="0">
+              <a:rPr lang="en-US" altLang="en-US" sz="3600" dirty="0">
                 <a:solidFill>
                   <a:srgbClr val="1C1C1C"/>
                 </a:solidFill>
@@ -9773,9 +10235,9 @@
                 <a:cs typeface="Nourd-SemiBold" panose="01000000000000000000" charset="0"/>
                 <a:sym typeface="Nourd Bold" panose="00000800000000000000"/>
               </a:rPr>
-              <a:t>data quality maintainence</a:t>
-            </a:r>
-            <a:endParaRPr lang="en-US" altLang="en-US" sz="3200" dirty="0">
+              <a:t>experimental error</a:t>
+            </a:r>
+            <a:endParaRPr lang="en-US" altLang="en-US" sz="3600" dirty="0">
               <a:solidFill>
                 <a:srgbClr val="1C1C1C"/>
               </a:solidFill>
@@ -9800,7 +10262,7 @@
               <a:buChar char="•"/>
             </a:pPr>
             <a:r>
-              <a:rPr lang="en-US" altLang="en-US" sz="3200" dirty="0">
+              <a:rPr lang="en-US" altLang="en-US" sz="3600" dirty="0">
                 <a:solidFill>
                   <a:srgbClr val="1C1C1C"/>
                 </a:solidFill>
@@ -9809,9 +10271,9 @@
                 <a:cs typeface="Nourd-SemiBold" panose="01000000000000000000" charset="0"/>
                 <a:sym typeface="Nourd Bold" panose="00000800000000000000"/>
               </a:rPr>
-              <a:t>model performance</a:t>
-            </a:r>
-            <a:endParaRPr lang="en-US" altLang="en-US" sz="3200" dirty="0">
+              <a:t>natural variation</a:t>
+            </a:r>
+            <a:endParaRPr lang="en-US" altLang="en-US" sz="3600" dirty="0">
               <a:solidFill>
                 <a:srgbClr val="1C1C1C"/>
               </a:solidFill>
@@ -9835,7 +10297,7 @@
               <a:buFont typeface="Arial" panose="020B0604020202020204" pitchFamily="34" charset="0"/>
               <a:buChar char="•"/>
             </a:pPr>
-            <a:endParaRPr lang="en-US" altLang="en-US" sz="3200" dirty="0">
+            <a:endParaRPr lang="en-US" altLang="en-US" sz="3600" dirty="0">
               <a:solidFill>
                 <a:srgbClr val="1C1C1C"/>
               </a:solidFill>

</xml_diff>